<commit_message>
Added the auto actor to change the kypo user setting.
</commit_message>
<xml_diff>
--- a/doc/User_Action_Emulator_Design_Doc_v0.2.pptx
+++ b/doc/User_Action_Emulator_Design_Doc_v0.2.pptx
@@ -208,7 +208,7 @@
           <a:p>
             <a:fld id="{2BA6DB02-48BF-406A-9449-0BBAAE1D3FCC}" type="datetimeFigureOut">
               <a:rPr lang="en-SG" smtClean="0"/>
-              <a:t>1/2/2023</a:t>
+              <a:t>7/2/2023</a:t>
             </a:fld>
             <a:endParaRPr lang="en-SG" dirty="0"/>
           </a:p>
@@ -961,7 +961,7 @@
           <a:p>
             <a:fld id="{568D23B1-6EF9-4DFF-A006-F22E70A73051}" type="datetimeFigureOut">
               <a:rPr lang="en-SG" smtClean="0"/>
-              <a:t>1/2/2023</a:t>
+              <a:t>7/2/2023</a:t>
             </a:fld>
             <a:endParaRPr lang="en-SG" dirty="0"/>
           </a:p>
@@ -1161,7 +1161,7 @@
           <a:p>
             <a:fld id="{568D23B1-6EF9-4DFF-A006-F22E70A73051}" type="datetimeFigureOut">
               <a:rPr lang="en-SG" smtClean="0"/>
-              <a:t>1/2/2023</a:t>
+              <a:t>7/2/2023</a:t>
             </a:fld>
             <a:endParaRPr lang="en-SG" dirty="0"/>
           </a:p>
@@ -1371,7 +1371,7 @@
           <a:p>
             <a:fld id="{568D23B1-6EF9-4DFF-A006-F22E70A73051}" type="datetimeFigureOut">
               <a:rPr lang="en-SG" smtClean="0"/>
-              <a:t>1/2/2023</a:t>
+              <a:t>7/2/2023</a:t>
             </a:fld>
             <a:endParaRPr lang="en-SG" dirty="0"/>
           </a:p>
@@ -1571,7 +1571,7 @@
           <a:p>
             <a:fld id="{568D23B1-6EF9-4DFF-A006-F22E70A73051}" type="datetimeFigureOut">
               <a:rPr lang="en-SG" smtClean="0"/>
-              <a:t>1/2/2023</a:t>
+              <a:t>7/2/2023</a:t>
             </a:fld>
             <a:endParaRPr lang="en-SG" dirty="0"/>
           </a:p>
@@ -1847,7 +1847,7 @@
           <a:p>
             <a:fld id="{568D23B1-6EF9-4DFF-A006-F22E70A73051}" type="datetimeFigureOut">
               <a:rPr lang="en-SG" smtClean="0"/>
-              <a:t>1/2/2023</a:t>
+              <a:t>7/2/2023</a:t>
             </a:fld>
             <a:endParaRPr lang="en-SG" dirty="0"/>
           </a:p>
@@ -2115,7 +2115,7 @@
           <a:p>
             <a:fld id="{568D23B1-6EF9-4DFF-A006-F22E70A73051}" type="datetimeFigureOut">
               <a:rPr lang="en-SG" smtClean="0"/>
-              <a:t>1/2/2023</a:t>
+              <a:t>7/2/2023</a:t>
             </a:fld>
             <a:endParaRPr lang="en-SG" dirty="0"/>
           </a:p>
@@ -2530,7 +2530,7 @@
           <a:p>
             <a:fld id="{568D23B1-6EF9-4DFF-A006-F22E70A73051}" type="datetimeFigureOut">
               <a:rPr lang="en-SG" smtClean="0"/>
-              <a:t>1/2/2023</a:t>
+              <a:t>7/2/2023</a:t>
             </a:fld>
             <a:endParaRPr lang="en-SG" dirty="0"/>
           </a:p>
@@ -2672,7 +2672,7 @@
           <a:p>
             <a:fld id="{568D23B1-6EF9-4DFF-A006-F22E70A73051}" type="datetimeFigureOut">
               <a:rPr lang="en-SG" smtClean="0"/>
-              <a:t>1/2/2023</a:t>
+              <a:t>7/2/2023</a:t>
             </a:fld>
             <a:endParaRPr lang="en-SG" dirty="0"/>
           </a:p>
@@ -2785,7 +2785,7 @@
           <a:p>
             <a:fld id="{568D23B1-6EF9-4DFF-A006-F22E70A73051}" type="datetimeFigureOut">
               <a:rPr lang="en-SG" smtClean="0"/>
-              <a:t>1/2/2023</a:t>
+              <a:t>7/2/2023</a:t>
             </a:fld>
             <a:endParaRPr lang="en-SG" dirty="0"/>
           </a:p>
@@ -3098,7 +3098,7 @@
           <a:p>
             <a:fld id="{568D23B1-6EF9-4DFF-A006-F22E70A73051}" type="datetimeFigureOut">
               <a:rPr lang="en-SG" smtClean="0"/>
-              <a:t>1/2/2023</a:t>
+              <a:t>7/2/2023</a:t>
             </a:fld>
             <a:endParaRPr lang="en-SG" dirty="0"/>
           </a:p>
@@ -3387,7 +3387,7 @@
           <a:p>
             <a:fld id="{568D23B1-6EF9-4DFF-A006-F22E70A73051}" type="datetimeFigureOut">
               <a:rPr lang="en-SG" smtClean="0"/>
-              <a:t>1/2/2023</a:t>
+              <a:t>7/2/2023</a:t>
             </a:fld>
             <a:endParaRPr lang="en-SG" dirty="0"/>
           </a:p>
@@ -3630,7 +3630,7 @@
           <a:p>
             <a:fld id="{568D23B1-6EF9-4DFF-A006-F22E70A73051}" type="datetimeFigureOut">
               <a:rPr lang="en-SG" smtClean="0"/>
-              <a:t>1/2/2023</a:t>
+              <a:t>7/2/2023</a:t>
             </a:fld>
             <a:endParaRPr lang="en-SG" dirty="0"/>
           </a:p>
@@ -10153,7 +10153,7 @@
             </a:pPr>
             <a:r>
               <a:rPr lang="en-US" sz="1600" dirty="0"/>
-              <a:t>Customers whose system config setting and requirements keep updating, or need flexible tool to integrate different apps. </a:t>
+              <a:t>Customers whose system config setting and requirements keep updating or need flexible tool to integrate different apps. </a:t>
             </a:r>
           </a:p>
           <a:p>

</xml_diff>